<commit_message>
working towards final copy
</commit_message>
<xml_diff>
--- a/NonToxic_Communication.pptx
+++ b/NonToxic_Communication.pptx
@@ -5,10 +5,10 @@
     <p:sldMasterId id="2147483648" r:id="rId4"/>
   </p:sldMasterIdLst>
   <p:notesMasterIdLst>
-    <p:notesMasterId r:id="rId20"/>
+    <p:notesMasterId r:id="rId19"/>
   </p:notesMasterIdLst>
   <p:handoutMasterIdLst>
-    <p:handoutMasterId r:id="rId21"/>
+    <p:handoutMasterId r:id="rId20"/>
   </p:handoutMasterIdLst>
   <p:sldIdLst>
     <p:sldId id="2596" r:id="rId5"/>
@@ -24,8 +24,7 @@
     <p:sldId id="2581" r:id="rId15"/>
     <p:sldId id="2555" r:id="rId16"/>
     <p:sldId id="2607" r:id="rId17"/>
-    <p:sldId id="2602" r:id="rId18"/>
-    <p:sldId id="2608" r:id="rId19"/>
+    <p:sldId id="2608" r:id="rId18"/>
   </p:sldIdLst>
   <p:sldSz cx="12192000" cy="6858000"/>
   <p:notesSz cx="6858000" cy="9144000"/>
@@ -246,7 +245,7 @@
           <a:p>
             <a:fld id="{0248B25D-8766-427E-8C9E-4845048D8DFC}" type="datetimeFigureOut">
               <a:rPr lang="en-US" smtClean="0"/>
-              <a:t>6/23/2020</a:t>
+              <a:t>6/24/2020</a:t>
             </a:fld>
             <a:endParaRPr lang="en-US" dirty="0"/>
           </a:p>
@@ -423,7 +422,7 @@
           <a:p>
             <a:fld id="{426F439B-391B-4B41-826A-951FCF412C34}" type="datetimeFigureOut">
               <a:rPr lang="en-US" smtClean="0"/>
-              <a:t>6/22/2020</a:t>
+              <a:t>6/24/2020</a:t>
             </a:fld>
             <a:endParaRPr lang="en-US" dirty="0"/>
           </a:p>
@@ -10806,7 +10805,7 @@
             </a:ln>
             <a:extLst>
               <a:ext uri="{C572A759-6A51-4108-AA02-DFA0A04FC94B}">
-                <ma14:wrappingTextBoxFlag xmlns:ma14="http://schemas.microsoft.com/office/mac/drawingml/2011/main" xmlns="" val="1"/>
+                <ma14:wrappingTextBoxFlag xmlns="" xmlns:ma14="http://schemas.microsoft.com/office/mac/drawingml/2011/main" val="1"/>
               </a:ext>
             </a:extLst>
           </p:spPr>
@@ -11042,7 +11041,7 @@
             </a:ln>
             <a:extLst>
               <a:ext uri="{C572A759-6A51-4108-AA02-DFA0A04FC94B}">
-                <ma14:wrappingTextBoxFlag xmlns:ma14="http://schemas.microsoft.com/office/mac/drawingml/2011/main" xmlns="" val="1"/>
+                <ma14:wrappingTextBoxFlag xmlns="" xmlns:ma14="http://schemas.microsoft.com/office/mac/drawingml/2011/main" val="1"/>
               </a:ext>
             </a:extLst>
           </p:spPr>
@@ -11278,7 +11277,7 @@
             </a:ln>
             <a:extLst>
               <a:ext uri="{C572A759-6A51-4108-AA02-DFA0A04FC94B}">
-                <ma14:wrappingTextBoxFlag xmlns:ma14="http://schemas.microsoft.com/office/mac/drawingml/2011/main" xmlns="" val="1"/>
+                <ma14:wrappingTextBoxFlag xmlns="" xmlns:ma14="http://schemas.microsoft.com/office/mac/drawingml/2011/main" val="1"/>
               </a:ext>
             </a:extLst>
           </p:spPr>
@@ -22790,8 +22789,8 @@
         </p:nvSpPr>
         <p:spPr>
           <a:xfrm>
-            <a:off x="653143" y="2032907"/>
-            <a:ext cx="3755571" cy="1569660"/>
+            <a:off x="284481" y="2032907"/>
+            <a:ext cx="4124234" cy="1015663"/>
           </a:xfrm>
           <a:prstGeom prst="rect">
             <a:avLst/>
@@ -22805,75 +22804,6 @@
           <a:lstStyle/>
           <a:p>
             <a:r>
-              <a:rPr lang="en-US" sz="9600" dirty="0">
-                <a:solidFill>
-                  <a:schemeClr val="bg1"/>
-                </a:solidFill>
-              </a:rPr>
-              <a:t>LSTM</a:t>
-            </a:r>
-          </a:p>
-        </p:txBody>
-      </p:sp>
-    </p:spTree>
-    <p:extLst>
-      <p:ext uri="{BB962C8B-B14F-4D97-AF65-F5344CB8AC3E}">
-        <p14:creationId xmlns:p14="http://schemas.microsoft.com/office/powerpoint/2010/main" val="4171130381"/>
-      </p:ext>
-    </p:extLst>
-  </p:cSld>
-  <p:clrMapOvr>
-    <a:masterClrMapping/>
-  </p:clrMapOvr>
-</p:sld>
-</file>
-
-<file path=ppt/slides/slide15.xml><?xml version="1.0" encoding="utf-8"?>
-<p:sld xmlns:a="http://schemas.openxmlformats.org/drawingml/2006/main" xmlns:r="http://schemas.openxmlformats.org/officeDocument/2006/relationships" xmlns:p="http://schemas.openxmlformats.org/presentationml/2006/main">
-  <p:cSld>
-    <p:spTree>
-      <p:nvGrpSpPr>
-        <p:cNvPr id="1" name=""/>
-        <p:cNvGrpSpPr/>
-        <p:nvPr/>
-      </p:nvGrpSpPr>
-      <p:grpSpPr>
-        <a:xfrm>
-          <a:off x="0" y="0"/>
-          <a:ext cx="0" cy="0"/>
-          <a:chOff x="0" y="0"/>
-          <a:chExt cx="0" cy="0"/>
-        </a:xfrm>
-      </p:grpSpPr>
-      <p:sp>
-        <p:nvSpPr>
-          <p:cNvPr id="5" name="TextBox 4">
-            <a:extLst>
-              <a:ext uri="{FF2B5EF4-FFF2-40B4-BE49-F238E27FC236}">
-                <a16:creationId xmlns:a16="http://schemas.microsoft.com/office/drawing/2014/main" id="{47F5AA85-3323-4102-A946-D284FF5C5BE8}"/>
-              </a:ext>
-            </a:extLst>
-          </p:cNvPr>
-          <p:cNvSpPr txBox="1"/>
-          <p:nvPr/>
-        </p:nvSpPr>
-        <p:spPr>
-          <a:xfrm>
-            <a:off x="284481" y="2032907"/>
-            <a:ext cx="4124234" cy="1015663"/>
-          </a:xfrm>
-          <a:prstGeom prst="rect">
-            <a:avLst/>
-          </a:prstGeom>
-          <a:noFill/>
-        </p:spPr>
-        <p:txBody>
-          <a:bodyPr wrap="square" rtlCol="0">
-            <a:spAutoFit/>
-          </a:bodyPr>
-          <a:lstStyle/>
-          <a:p>
-            <a:r>
               <a:rPr lang="en-US" sz="6000" dirty="0">
                 <a:solidFill>
                   <a:schemeClr val="bg1"/>
@@ -22886,10 +22816,10 @@
       </p:sp>
       <p:pic>
         <p:nvPicPr>
-          <p:cNvPr id="2" name="Picture 1">
-            <a:extLst>
-              <a:ext uri="{FF2B5EF4-FFF2-40B4-BE49-F238E27FC236}">
-                <a16:creationId xmlns:a16="http://schemas.microsoft.com/office/drawing/2014/main" id="{52C5C067-6032-439C-831E-4360FB995564}"/>
+          <p:cNvPr id="4" name="Picture 3">
+            <a:extLst>
+              <a:ext uri="{FF2B5EF4-FFF2-40B4-BE49-F238E27FC236}">
+                <a16:creationId xmlns:a16="http://schemas.microsoft.com/office/drawing/2014/main" id="{BD420869-4A42-4935-BB8A-1D81EA5B2388}"/>
               </a:ext>
             </a:extLst>
           </p:cNvPr>
@@ -22906,8 +22836,8 @@
         </p:blipFill>
         <p:spPr>
           <a:xfrm>
-            <a:off x="4479835" y="251989"/>
-            <a:ext cx="7346627" cy="6333701"/>
+            <a:off x="4335143" y="494806"/>
+            <a:ext cx="7694770" cy="6363193"/>
           </a:xfrm>
           <a:prstGeom prst="rect">
             <a:avLst/>
@@ -22928,7 +22858,7 @@
         </p:nvSpPr>
         <p:spPr>
           <a:xfrm>
-            <a:off x="4883026" y="2301239"/>
+            <a:off x="5168557" y="2578886"/>
             <a:ext cx="1121534" cy="1076960"/>
           </a:xfrm>
           <a:prstGeom prst="ellipse">
@@ -22976,7 +22906,7 @@
         </p:nvSpPr>
         <p:spPr>
           <a:xfrm>
-            <a:off x="4883026" y="4185920"/>
+            <a:off x="5116007" y="4375108"/>
             <a:ext cx="1121534" cy="1076960"/>
           </a:xfrm>
           <a:prstGeom prst="ellipse">
@@ -23024,7 +22954,7 @@
         </p:nvSpPr>
         <p:spPr>
           <a:xfrm>
-            <a:off x="6843906" y="4196080"/>
+            <a:off x="6948252" y="4354085"/>
             <a:ext cx="1121534" cy="1076960"/>
           </a:xfrm>
           <a:prstGeom prst="ellipse">
@@ -31677,21 +31607,21 @@
 </file>
 
 <file path=customXml/item2.xml><?xml version="1.0" encoding="utf-8"?>
+<p:properties xmlns:p="http://schemas.microsoft.com/office/2006/metadata/properties" xmlns:xsi="http://www.w3.org/2001/XMLSchema-instance" xmlns:pc="http://schemas.microsoft.com/office/infopath/2007/PartnerControls">
+  <documentManagement>
+    <Status xmlns="71af3243-3dd4-4a8d-8c0d-dd76da1f02a5">Not started</Status>
+    <MediaServiceKeyPoints xmlns="71af3243-3dd4-4a8d-8c0d-dd76da1f02a5" xsi:nil="true"/>
+  </documentManagement>
+</p:properties>
+</file>
+
+<file path=customXml/item3.xml><?xml version="1.0" encoding="utf-8"?>
 <?mso-contentType ?>
 <FormTemplates xmlns="http://schemas.microsoft.com/sharepoint/v3/contenttype/forms">
   <Display>DocumentLibraryForm</Display>
   <Edit>DocumentLibraryForm</Edit>
   <New>DocumentLibraryForm</New>
 </FormTemplates>
-</file>
-
-<file path=customXml/item3.xml><?xml version="1.0" encoding="utf-8"?>
-<p:properties xmlns:p="http://schemas.microsoft.com/office/2006/metadata/properties" xmlns:xsi="http://www.w3.org/2001/XMLSchema-instance" xmlns:pc="http://schemas.microsoft.com/office/infopath/2007/PartnerControls">
-  <documentManagement>
-    <Status xmlns="71af3243-3dd4-4a8d-8c0d-dd76da1f02a5">Not started</Status>
-    <MediaServiceKeyPoints xmlns="71af3243-3dd4-4a8d-8c0d-dd76da1f02a5" xsi:nil="true"/>
-  </documentManagement>
-</p:properties>
 </file>
 
 <file path=customXml/itemProps1.xml><?xml version="1.0" encoding="utf-8"?>
@@ -31714,14 +31644,6 @@
 </file>
 
 <file path=customXml/itemProps2.xml><?xml version="1.0" encoding="utf-8"?>
-<ds:datastoreItem xmlns:ds="http://schemas.openxmlformats.org/officeDocument/2006/customXml" ds:itemID="{5E8B52BE-6787-403E-A094-B18CEB016691}">
-  <ds:schemaRefs>
-    <ds:schemaRef ds:uri="http://schemas.microsoft.com/sharepoint/v3/contenttype/forms"/>
-  </ds:schemaRefs>
-</ds:datastoreItem>
-</file>
-
-<file path=customXml/itemProps3.xml><?xml version="1.0" encoding="utf-8"?>
 <ds:datastoreItem xmlns:ds="http://schemas.openxmlformats.org/officeDocument/2006/customXml" ds:itemID="{D0FE9C68-0C22-4EEC-B457-063807029368}">
   <ds:schemaRefs>
     <ds:schemaRef ds:uri="http://schemas.microsoft.com/office/2006/metadata/properties"/>
@@ -31736,4 +31658,12 @@
     <ds:schemaRef ds:uri="http://purl.org/dc/terms/"/>
   </ds:schemaRefs>
 </ds:datastoreItem>
+</file>
+
+<file path=customXml/itemProps3.xml><?xml version="1.0" encoding="utf-8"?>
+<ds:datastoreItem xmlns:ds="http://schemas.openxmlformats.org/officeDocument/2006/customXml" ds:itemID="{5E8B52BE-6787-403E-A094-B18CEB016691}">
+  <ds:schemaRefs>
+    <ds:schemaRef ds:uri="http://schemas.microsoft.com/sharepoint/v3/contenttype/forms"/>
+  </ds:schemaRefs>
+</ds:datastoreItem>
 </file>
</xml_diff>